<commit_message>
edit materi part 44
</commit_message>
<xml_diff>
--- a/dunia ilkom/PPT/PART 44 REPEAT UNTIL.pptx
+++ b/dunia ilkom/PPT/PART 44 REPEAT UNTIL.pptx
@@ -11,6 +11,8 @@
     <p:sldId id="259" r:id="rId5"/>
     <p:sldId id="260" r:id="rId6"/>
     <p:sldId id="261" r:id="rId7"/>
+    <p:sldId id="262" r:id="rId8"/>
+    <p:sldId id="263" r:id="rId9"/>
   </p:sldIdLst>
   <p:sldSz cx="12192000" cy="6858000"/>
   <p:notesSz cx="6858000" cy="9144000"/>
@@ -4250,6 +4252,326 @@
 </p:sld>
 </file>
 
+<file path=ppt/slides/slide7.xml><?xml version="1.0" encoding="utf-8"?>
+<p:sld xmlns:a="http://schemas.openxmlformats.org/drawingml/2006/main" xmlns:r="http://schemas.openxmlformats.org/officeDocument/2006/relationships" xmlns:p="http://schemas.openxmlformats.org/presentationml/2006/main">
+  <p:cSld>
+    <p:spTree>
+      <p:nvGrpSpPr>
+        <p:cNvPr id="1" name=""/>
+        <p:cNvGrpSpPr/>
+        <p:nvPr/>
+      </p:nvGrpSpPr>
+      <p:grpSpPr>
+        <a:xfrm>
+          <a:off x="0" y="0"/>
+          <a:ext cx="0" cy="0"/>
+          <a:chOff x="0" y="0"/>
+          <a:chExt cx="0" cy="0"/>
+        </a:xfrm>
+      </p:grpSpPr>
+      <p:sp>
+        <p:nvSpPr>
+          <p:cNvPr id="2" name="Title 1">
+            <a:extLst>
+              <a:ext uri="{FF2B5EF4-FFF2-40B4-BE49-F238E27FC236}">
+                <a16:creationId xmlns:a16="http://schemas.microsoft.com/office/drawing/2014/main" id="{97D7D448-9402-4E53-AA06-2DAD5D44EEDA}"/>
+              </a:ext>
+            </a:extLst>
+          </p:cNvPr>
+          <p:cNvSpPr>
+            <a:spLocks noGrp="1"/>
+          </p:cNvSpPr>
+          <p:nvPr>
+            <p:ph type="title"/>
+          </p:nvPr>
+        </p:nvSpPr>
+        <p:spPr>
+          <a:xfrm>
+            <a:off x="1451579" y="575815"/>
+            <a:ext cx="9603275" cy="1439917"/>
+          </a:xfrm>
+        </p:spPr>
+        <p:txBody>
+          <a:bodyPr>
+            <a:normAutofit fontScale="90000"/>
+          </a:bodyPr>
+          <a:lstStyle/>
+          <a:p>
+            <a:r>
+              <a:rPr lang="en-US" dirty="0"/>
+              <a:t>Repeat until juga </a:t>
+            </a:r>
+            <a:r>
+              <a:rPr lang="en-US" dirty="0" err="1"/>
+              <a:t>bisa</a:t>
+            </a:r>
+            <a:r>
+              <a:rPr lang="en-US" dirty="0"/>
+              <a:t> </a:t>
+            </a:r>
+            <a:r>
+              <a:rPr lang="en-US" dirty="0" err="1"/>
+              <a:t>dipakai</a:t>
+            </a:r>
+            <a:r>
+              <a:rPr lang="en-US" dirty="0"/>
+              <a:t> </a:t>
+            </a:r>
+            <a:r>
+              <a:rPr lang="en-US" dirty="0" err="1"/>
+              <a:t>untuk</a:t>
+            </a:r>
+            <a:r>
+              <a:rPr lang="en-US" dirty="0"/>
+              <a:t> </a:t>
+            </a:r>
+            <a:r>
+              <a:rPr lang="en-US" dirty="0" err="1"/>
+              <a:t>membuat</a:t>
+            </a:r>
+            <a:r>
+              <a:rPr lang="en-US" dirty="0"/>
+              <a:t> </a:t>
+            </a:r>
+            <a:r>
+              <a:rPr lang="en-US" dirty="0" err="1"/>
+              <a:t>perulangan</a:t>
+            </a:r>
+            <a:r>
+              <a:rPr lang="en-US" dirty="0"/>
+              <a:t> yang </a:t>
+            </a:r>
+            <a:r>
+              <a:rPr lang="en-US" dirty="0" err="1"/>
+              <a:t>jumlah</a:t>
+            </a:r>
+            <a:r>
+              <a:rPr lang="en-US" dirty="0"/>
+              <a:t> </a:t>
+            </a:r>
+            <a:r>
+              <a:rPr lang="en-US" dirty="0" err="1"/>
+              <a:t>iterasinya</a:t>
+            </a:r>
+            <a:r>
+              <a:rPr lang="en-US" dirty="0"/>
+              <a:t> </a:t>
+            </a:r>
+            <a:r>
+              <a:rPr lang="en-US" dirty="0" err="1"/>
+              <a:t>belum</a:t>
+            </a:r>
+            <a:r>
+              <a:rPr lang="en-US" dirty="0"/>
+              <a:t> </a:t>
+            </a:r>
+            <a:r>
+              <a:rPr lang="en-US" dirty="0" err="1"/>
+              <a:t>bisa</a:t>
+            </a:r>
+            <a:r>
+              <a:rPr lang="en-US" dirty="0"/>
+              <a:t> </a:t>
+            </a:r>
+            <a:r>
+              <a:rPr lang="en-US" dirty="0" err="1"/>
+              <a:t>ditentukan</a:t>
+            </a:r>
+            <a:r>
+              <a:rPr lang="en-US" dirty="0"/>
+              <a:t> di </a:t>
+            </a:r>
+            <a:r>
+              <a:rPr lang="en-US" dirty="0" err="1"/>
+              <a:t>awal</a:t>
+            </a:r>
+            <a:r>
+              <a:rPr lang="en-US" dirty="0"/>
+              <a:t>, </a:t>
+            </a:r>
+            <a:r>
+              <a:rPr lang="en-US" dirty="0" err="1"/>
+              <a:t>seperti</a:t>
+            </a:r>
+            <a:r>
+              <a:rPr lang="en-US" dirty="0"/>
+              <a:t> </a:t>
+            </a:r>
+            <a:r>
+              <a:rPr lang="en-US" dirty="0" err="1"/>
+              <a:t>contoh</a:t>
+            </a:r>
+            <a:r>
+              <a:rPr lang="en-US" dirty="0"/>
+              <a:t> </a:t>
+            </a:r>
+            <a:r>
+              <a:rPr lang="en-US" dirty="0" err="1"/>
+              <a:t>berikut</a:t>
+            </a:r>
+            <a:r>
+              <a:rPr lang="en-US" dirty="0"/>
+              <a:t>:</a:t>
+            </a:r>
+          </a:p>
+        </p:txBody>
+      </p:sp>
+      <p:pic>
+        <p:nvPicPr>
+          <p:cNvPr id="5" name="Content Placeholder 4">
+            <a:extLst>
+              <a:ext uri="{FF2B5EF4-FFF2-40B4-BE49-F238E27FC236}">
+                <a16:creationId xmlns:a16="http://schemas.microsoft.com/office/drawing/2014/main" id="{93AE58AE-BBD6-41C5-BA7A-888D98D1E581}"/>
+              </a:ext>
+            </a:extLst>
+          </p:cNvPr>
+          <p:cNvPicPr>
+            <a:picLocks noGrp="1" noChangeAspect="1"/>
+          </p:cNvPicPr>
+          <p:nvPr>
+            <p:ph idx="1"/>
+          </p:nvPr>
+        </p:nvPicPr>
+        <p:blipFill>
+          <a:blip r:embed="rId2"/>
+          <a:stretch>
+            <a:fillRect/>
+          </a:stretch>
+        </p:blipFill>
+        <p:spPr>
+          <a:xfrm>
+            <a:off x="2481730" y="2016125"/>
+            <a:ext cx="7542865" cy="3449638"/>
+          </a:xfrm>
+        </p:spPr>
+      </p:pic>
+    </p:spTree>
+    <p:extLst>
+      <p:ext uri="{BB962C8B-B14F-4D97-AF65-F5344CB8AC3E}">
+        <p14:creationId xmlns:p14="http://schemas.microsoft.com/office/powerpoint/2010/main" val="82699537"/>
+      </p:ext>
+    </p:extLst>
+  </p:cSld>
+  <p:clrMapOvr>
+    <a:masterClrMapping/>
+  </p:clrMapOvr>
+</p:sld>
+</file>
+
+<file path=ppt/slides/slide8.xml><?xml version="1.0" encoding="utf-8"?>
+<p:sld xmlns:a="http://schemas.openxmlformats.org/drawingml/2006/main" xmlns:r="http://schemas.openxmlformats.org/officeDocument/2006/relationships" xmlns:p="http://schemas.openxmlformats.org/presentationml/2006/main">
+  <p:cSld>
+    <p:spTree>
+      <p:nvGrpSpPr>
+        <p:cNvPr id="1" name=""/>
+        <p:cNvGrpSpPr/>
+        <p:nvPr/>
+      </p:nvGrpSpPr>
+      <p:grpSpPr>
+        <a:xfrm>
+          <a:off x="0" y="0"/>
+          <a:ext cx="0" cy="0"/>
+          <a:chOff x="0" y="0"/>
+          <a:chExt cx="0" cy="0"/>
+        </a:xfrm>
+      </p:grpSpPr>
+      <p:sp>
+        <p:nvSpPr>
+          <p:cNvPr id="2" name="Title 1">
+            <a:extLst>
+              <a:ext uri="{FF2B5EF4-FFF2-40B4-BE49-F238E27FC236}">
+                <a16:creationId xmlns:a16="http://schemas.microsoft.com/office/drawing/2014/main" id="{A6E7877F-AF0B-4D67-8EBC-D89CE7629EE4}"/>
+              </a:ext>
+            </a:extLst>
+          </p:cNvPr>
+          <p:cNvSpPr>
+            <a:spLocks noGrp="1"/>
+          </p:cNvSpPr>
+          <p:nvPr>
+            <p:ph type="title"/>
+          </p:nvPr>
+        </p:nvSpPr>
+        <p:spPr/>
+        <p:txBody>
+          <a:bodyPr/>
+          <a:lstStyle/>
+          <a:p>
+            <a:endParaRPr lang="en-US"/>
+          </a:p>
+        </p:txBody>
+      </p:sp>
+      <p:pic>
+        <p:nvPicPr>
+          <p:cNvPr id="5" name="Content Placeholder 4">
+            <a:extLst>
+              <a:ext uri="{FF2B5EF4-FFF2-40B4-BE49-F238E27FC236}">
+                <a16:creationId xmlns:a16="http://schemas.microsoft.com/office/drawing/2014/main" id="{A839E3B0-1C97-42C5-A756-A467DDB5C75D}"/>
+              </a:ext>
+            </a:extLst>
+          </p:cNvPr>
+          <p:cNvPicPr>
+            <a:picLocks noGrp="1" noChangeAspect="1"/>
+          </p:cNvPicPr>
+          <p:nvPr>
+            <p:ph idx="1"/>
+          </p:nvPr>
+        </p:nvPicPr>
+        <p:blipFill>
+          <a:blip r:embed="rId2"/>
+          <a:stretch>
+            <a:fillRect/>
+          </a:stretch>
+        </p:blipFill>
+        <p:spPr>
+          <a:xfrm>
+            <a:off x="-226436" y="435305"/>
+            <a:ext cx="5895975" cy="1418449"/>
+          </a:xfrm>
+        </p:spPr>
+      </p:pic>
+      <p:pic>
+        <p:nvPicPr>
+          <p:cNvPr id="9" name="Picture 8">
+            <a:extLst>
+              <a:ext uri="{FF2B5EF4-FFF2-40B4-BE49-F238E27FC236}">
+                <a16:creationId xmlns:a16="http://schemas.microsoft.com/office/drawing/2014/main" id="{5C7091AC-3BA7-4F46-B4BA-AD455FE72FB0}"/>
+              </a:ext>
+            </a:extLst>
+          </p:cNvPr>
+          <p:cNvPicPr>
+            <a:picLocks noChangeAspect="1"/>
+          </p:cNvPicPr>
+          <p:nvPr/>
+        </p:nvPicPr>
+        <p:blipFill>
+          <a:blip r:embed="rId3"/>
+          <a:stretch>
+            <a:fillRect/>
+          </a:stretch>
+        </p:blipFill>
+        <p:spPr>
+          <a:xfrm>
+            <a:off x="5669539" y="1204445"/>
+            <a:ext cx="5895975" cy="5495925"/>
+          </a:xfrm>
+          <a:prstGeom prst="rect">
+            <a:avLst/>
+          </a:prstGeom>
+        </p:spPr>
+      </p:pic>
+    </p:spTree>
+    <p:extLst>
+      <p:ext uri="{BB962C8B-B14F-4D97-AF65-F5344CB8AC3E}">
+        <p14:creationId xmlns:p14="http://schemas.microsoft.com/office/powerpoint/2010/main" val="3648949901"/>
+      </p:ext>
+    </p:extLst>
+  </p:cSld>
+  <p:clrMapOvr>
+    <a:masterClrMapping/>
+  </p:clrMapOvr>
+</p:sld>
+</file>
+
 <file path=ppt/theme/theme1.xml><?xml version="1.0" encoding="utf-8"?>
 <a:theme xmlns:a="http://schemas.openxmlformats.org/drawingml/2006/main" name="Gallery">
   <a:themeElements>

</xml_diff>